<commit_message>
Intro stuff and Flowcharts
</commit_message>
<xml_diff>
--- a/slides/00-Intro-memory-function.pptx
+++ b/slides/00-Intro-memory-function.pptx
@@ -140,6 +140,115 @@
 
 <file path=ppt/changesInfos/changesInfo1.xml><?xml version="1.0" encoding="utf-8"?>
 <pc:chgInfo xmlns:a="http://schemas.openxmlformats.org/drawingml/2006/main" xmlns:r="http://schemas.openxmlformats.org/officeDocument/2006/relationships" xmlns:ac="http://schemas.microsoft.com/office/drawing/2013/main/command" xmlns:pc="http://schemas.microsoft.com/office/powerpoint/2013/main/command">
+  <pc:docChgLst>
+    <pc:chgData name="Badrinath R" userId="155a43e7-1f5f-414f-9bca-c8a1af989a19" providerId="ADAL" clId="{88A26AFE-0B94-4104-B23F-E1C47EF633DC}"/>
+    <pc:docChg chg="undo custSel modSld">
+      <pc:chgData name="Badrinath R" userId="155a43e7-1f5f-414f-9bca-c8a1af989a19" providerId="ADAL" clId="{88A26AFE-0B94-4104-B23F-E1C47EF633DC}" dt="2025-08-01T07:53:12.990" v="312" actId="729"/>
+      <pc:docMkLst>
+        <pc:docMk/>
+      </pc:docMkLst>
+      <pc:sldChg chg="addSp delSp modSp mod">
+        <pc:chgData name="Badrinath R" userId="155a43e7-1f5f-414f-9bca-c8a1af989a19" providerId="ADAL" clId="{88A26AFE-0B94-4104-B23F-E1C47EF633DC}" dt="2025-08-01T07:46:26.516" v="111" actId="1036"/>
+        <pc:sldMkLst>
+          <pc:docMk/>
+          <pc:sldMk cId="2870837715" sldId="263"/>
+        </pc:sldMkLst>
+        <pc:spChg chg="mod">
+          <ac:chgData name="Badrinath R" userId="155a43e7-1f5f-414f-9bca-c8a1af989a19" providerId="ADAL" clId="{88A26AFE-0B94-4104-B23F-E1C47EF633DC}" dt="2025-08-01T07:41:19.401" v="63" actId="20577"/>
+          <ac:spMkLst>
+            <pc:docMk/>
+            <pc:sldMk cId="2870837715" sldId="263"/>
+            <ac:spMk id="2" creationId="{00000000-0000-0000-0000-000000000000}"/>
+          </ac:spMkLst>
+        </pc:spChg>
+        <pc:spChg chg="add del mod">
+          <ac:chgData name="Badrinath R" userId="155a43e7-1f5f-414f-9bca-c8a1af989a19" providerId="ADAL" clId="{88A26AFE-0B94-4104-B23F-E1C47EF633DC}" dt="2025-08-01T07:43:07.805" v="69" actId="478"/>
+          <ac:spMkLst>
+            <pc:docMk/>
+            <pc:sldMk cId="2870837715" sldId="263"/>
+            <ac:spMk id="12" creationId="{4CD8E5B8-39E3-48F7-8437-54A2981E6C4F}"/>
+          </ac:spMkLst>
+        </pc:spChg>
+        <pc:spChg chg="add mod">
+          <ac:chgData name="Badrinath R" userId="155a43e7-1f5f-414f-9bca-c8a1af989a19" providerId="ADAL" clId="{88A26AFE-0B94-4104-B23F-E1C47EF633DC}" dt="2025-08-01T07:45:48.646" v="105" actId="1038"/>
+          <ac:spMkLst>
+            <pc:docMk/>
+            <pc:sldMk cId="2870837715" sldId="263"/>
+            <ac:spMk id="15" creationId="{0E2A0AA5-370C-2CDC-291C-5366C6D573A4}"/>
+          </ac:spMkLst>
+        </pc:spChg>
+        <pc:spChg chg="add del mod">
+          <ac:chgData name="Badrinath R" userId="155a43e7-1f5f-414f-9bca-c8a1af989a19" providerId="ADAL" clId="{88A26AFE-0B94-4104-B23F-E1C47EF633DC}" dt="2025-08-01T07:45:05.427" v="92" actId="478"/>
+          <ac:spMkLst>
+            <pc:docMk/>
+            <pc:sldMk cId="2870837715" sldId="263"/>
+            <ac:spMk id="18" creationId="{535C2E52-D5DE-F528-BB68-F673F584D84E}"/>
+          </ac:spMkLst>
+        </pc:spChg>
+        <pc:spChg chg="add mod">
+          <ac:chgData name="Badrinath R" userId="155a43e7-1f5f-414f-9bca-c8a1af989a19" providerId="ADAL" clId="{88A26AFE-0B94-4104-B23F-E1C47EF633DC}" dt="2025-08-01T07:45:48.646" v="105" actId="1038"/>
+          <ac:spMkLst>
+            <pc:docMk/>
+            <pc:sldMk cId="2870837715" sldId="263"/>
+            <ac:spMk id="20" creationId="{92B1250C-8D0C-4287-C234-67F24BFA68DE}"/>
+          </ac:spMkLst>
+        </pc:spChg>
+        <pc:cxnChg chg="mod">
+          <ac:chgData name="Badrinath R" userId="155a43e7-1f5f-414f-9bca-c8a1af989a19" providerId="ADAL" clId="{88A26AFE-0B94-4104-B23F-E1C47EF633DC}" dt="2025-08-01T07:46:26.516" v="111" actId="1036"/>
+          <ac:cxnSpMkLst>
+            <pc:docMk/>
+            <pc:sldMk cId="2870837715" sldId="263"/>
+            <ac:cxnSpMk id="19" creationId="{00000000-0000-0000-0000-000000000000}"/>
+          </ac:cxnSpMkLst>
+        </pc:cxnChg>
+      </pc:sldChg>
+      <pc:sldChg chg="modSp mod">
+        <pc:chgData name="Badrinath R" userId="155a43e7-1f5f-414f-9bca-c8a1af989a19" providerId="ADAL" clId="{88A26AFE-0B94-4104-B23F-E1C47EF633DC}" dt="2025-07-22T14:03:10.744" v="29" actId="114"/>
+        <pc:sldMkLst>
+          <pc:docMk/>
+          <pc:sldMk cId="2320892863" sldId="268"/>
+        </pc:sldMkLst>
+        <pc:spChg chg="mod">
+          <ac:chgData name="Badrinath R" userId="155a43e7-1f5f-414f-9bca-c8a1af989a19" providerId="ADAL" clId="{88A26AFE-0B94-4104-B23F-E1C47EF633DC}" dt="2025-07-22T14:02:19.053" v="26" actId="113"/>
+          <ac:spMkLst>
+            <pc:docMk/>
+            <pc:sldMk cId="2320892863" sldId="268"/>
+            <ac:spMk id="2" creationId="{00000000-0000-0000-0000-000000000000}"/>
+          </ac:spMkLst>
+        </pc:spChg>
+        <pc:spChg chg="mod">
+          <ac:chgData name="Badrinath R" userId="155a43e7-1f5f-414f-9bca-c8a1af989a19" providerId="ADAL" clId="{88A26AFE-0B94-4104-B23F-E1C47EF633DC}" dt="2025-07-22T14:03:10.744" v="29" actId="114"/>
+          <ac:spMkLst>
+            <pc:docMk/>
+            <pc:sldMk cId="2320892863" sldId="268"/>
+            <ac:spMk id="3" creationId="{00000000-0000-0000-0000-000000000000}"/>
+          </ac:spMkLst>
+        </pc:spChg>
+      </pc:sldChg>
+      <pc:sldChg chg="mod modShow">
+        <pc:chgData name="Badrinath R" userId="155a43e7-1f5f-414f-9bca-c8a1af989a19" providerId="ADAL" clId="{88A26AFE-0B94-4104-B23F-E1C47EF633DC}" dt="2025-08-01T07:53:12.990" v="312" actId="729"/>
+        <pc:sldMkLst>
+          <pc:docMk/>
+          <pc:sldMk cId="2548858015" sldId="273"/>
+        </pc:sldMkLst>
+      </pc:sldChg>
+      <pc:sldChg chg="modSp mod">
+        <pc:chgData name="Badrinath R" userId="155a43e7-1f5f-414f-9bca-c8a1af989a19" providerId="ADAL" clId="{88A26AFE-0B94-4104-B23F-E1C47EF633DC}" dt="2025-08-01T07:49:44.182" v="311" actId="20577"/>
+        <pc:sldMkLst>
+          <pc:docMk/>
+          <pc:sldMk cId="997026383" sldId="282"/>
+        </pc:sldMkLst>
+        <pc:spChg chg="mod">
+          <ac:chgData name="Badrinath R" userId="155a43e7-1f5f-414f-9bca-c8a1af989a19" providerId="ADAL" clId="{88A26AFE-0B94-4104-B23F-E1C47EF633DC}" dt="2025-08-01T07:49:44.182" v="311" actId="20577"/>
+          <ac:spMkLst>
+            <pc:docMk/>
+            <pc:sldMk cId="997026383" sldId="282"/>
+            <ac:spMk id="3" creationId="{9002E9F8-15FE-CD0A-E617-4CEAC862B506}"/>
+          </ac:spMkLst>
+        </pc:spChg>
+      </pc:sldChg>
+    </pc:docChg>
+  </pc:docChgLst>
   <pc:docChgLst>
     <pc:chgData name="Badrinath R" userId="155a43e7-1f5f-414f-9bca-c8a1af989a19" providerId="ADAL" clId="{B3415C0E-AC84-4EC3-BC04-72D0AF69EC24}"/>
     <pc:docChg chg="custSel addSld modSld">
@@ -1156,7 +1265,7 @@
           <a:p>
             <a:fld id="{4ACACA87-7038-476A-85F0-03D6E0AD7D58}" type="datetimeFigureOut">
               <a:rPr lang="en-US" smtClean="0"/>
-              <a:t>6/28/2025</a:t>
+              <a:t>8/1/2025</a:t>
             </a:fld>
             <a:endParaRPr lang="en-US"/>
           </a:p>
@@ -1324,7 +1433,7 @@
           <a:p>
             <a:fld id="{4ACACA87-7038-476A-85F0-03D6E0AD7D58}" type="datetimeFigureOut">
               <a:rPr lang="en-US" smtClean="0"/>
-              <a:t>6/28/2025</a:t>
+              <a:t>8/1/2025</a:t>
             </a:fld>
             <a:endParaRPr lang="en-US"/>
           </a:p>
@@ -1502,7 +1611,7 @@
           <a:p>
             <a:fld id="{4ACACA87-7038-476A-85F0-03D6E0AD7D58}" type="datetimeFigureOut">
               <a:rPr lang="en-US" smtClean="0"/>
-              <a:t>6/28/2025</a:t>
+              <a:t>8/1/2025</a:t>
             </a:fld>
             <a:endParaRPr lang="en-US"/>
           </a:p>
@@ -1670,7 +1779,7 @@
           <a:p>
             <a:fld id="{4ACACA87-7038-476A-85F0-03D6E0AD7D58}" type="datetimeFigureOut">
               <a:rPr lang="en-US" smtClean="0"/>
-              <a:t>6/28/2025</a:t>
+              <a:t>8/1/2025</a:t>
             </a:fld>
             <a:endParaRPr lang="en-US"/>
           </a:p>
@@ -1915,7 +2024,7 @@
           <a:p>
             <a:fld id="{4ACACA87-7038-476A-85F0-03D6E0AD7D58}" type="datetimeFigureOut">
               <a:rPr lang="en-US" smtClean="0"/>
-              <a:t>6/28/2025</a:t>
+              <a:t>8/1/2025</a:t>
             </a:fld>
             <a:endParaRPr lang="en-US"/>
           </a:p>
@@ -2144,7 +2253,7 @@
           <a:p>
             <a:fld id="{4ACACA87-7038-476A-85F0-03D6E0AD7D58}" type="datetimeFigureOut">
               <a:rPr lang="en-US" smtClean="0"/>
-              <a:t>6/28/2025</a:t>
+              <a:t>8/1/2025</a:t>
             </a:fld>
             <a:endParaRPr lang="en-US"/>
           </a:p>
@@ -2508,7 +2617,7 @@
           <a:p>
             <a:fld id="{4ACACA87-7038-476A-85F0-03D6E0AD7D58}" type="datetimeFigureOut">
               <a:rPr lang="en-US" smtClean="0"/>
-              <a:t>6/28/2025</a:t>
+              <a:t>8/1/2025</a:t>
             </a:fld>
             <a:endParaRPr lang="en-US"/>
           </a:p>
@@ -2625,7 +2734,7 @@
           <a:p>
             <a:fld id="{4ACACA87-7038-476A-85F0-03D6E0AD7D58}" type="datetimeFigureOut">
               <a:rPr lang="en-US" smtClean="0"/>
-              <a:t>6/28/2025</a:t>
+              <a:t>8/1/2025</a:t>
             </a:fld>
             <a:endParaRPr lang="en-US"/>
           </a:p>
@@ -2720,7 +2829,7 @@
           <a:p>
             <a:fld id="{4ACACA87-7038-476A-85F0-03D6E0AD7D58}" type="datetimeFigureOut">
               <a:rPr lang="en-US" smtClean="0"/>
-              <a:t>6/28/2025</a:t>
+              <a:t>8/1/2025</a:t>
             </a:fld>
             <a:endParaRPr lang="en-US"/>
           </a:p>
@@ -2995,7 +3104,7 @@
           <a:p>
             <a:fld id="{4ACACA87-7038-476A-85F0-03D6E0AD7D58}" type="datetimeFigureOut">
               <a:rPr lang="en-US" smtClean="0"/>
-              <a:t>6/28/2025</a:t>
+              <a:t>8/1/2025</a:t>
             </a:fld>
             <a:endParaRPr lang="en-US"/>
           </a:p>
@@ -3247,7 +3356,7 @@
           <a:p>
             <a:fld id="{4ACACA87-7038-476A-85F0-03D6E0AD7D58}" type="datetimeFigureOut">
               <a:rPr lang="en-US" smtClean="0"/>
-              <a:t>6/28/2025</a:t>
+              <a:t>8/1/2025</a:t>
             </a:fld>
             <a:endParaRPr lang="en-US"/>
           </a:p>
@@ -3458,7 +3567,7 @@
           <a:p>
             <a:fld id="{4ACACA87-7038-476A-85F0-03D6E0AD7D58}" type="datetimeFigureOut">
               <a:rPr lang="en-US" smtClean="0"/>
-              <a:t>6/28/2025</a:t>
+              <a:t>8/1/2025</a:t>
             </a:fld>
             <a:endParaRPr lang="en-US"/>
           </a:p>
@@ -4869,7 +4978,7 @@
           <a:p>
             <a:r>
               <a:rPr lang="en-US" dirty="0"/>
-              <a:t>Big Picture: Environments, Tools, Libraries</a:t>
+              <a:t>The Mechanics: Environments, Tools, Libraries</a:t>
             </a:r>
           </a:p>
         </p:txBody>
@@ -5476,24 +5585,23 @@
         <p:nvCxnSpPr>
           <p:cNvPr id="19" name="Straight Arrow Connector 18"/>
           <p:cNvCxnSpPr>
-            <a:stCxn id="11" idx="2"/>
-            <a:endCxn id="16" idx="0"/>
+            <a:cxnSpLocks/>
           </p:cNvCxnSpPr>
           <p:nvPr/>
         </p:nvCxnSpPr>
         <p:spPr>
           <a:xfrm>
-            <a:off x="2526336" y="4124527"/>
+            <a:off x="2541326" y="4109537"/>
             <a:ext cx="32046" cy="876254"/>
           </a:xfrm>
           <a:prstGeom prst="straightConnector1">
             <a:avLst/>
           </a:prstGeom>
-          <a:ln w="9525" cap="flat" cmpd="sng" algn="ctr">
+          <a:ln w="38100" cap="flat" cmpd="sng" algn="ctr">
             <a:solidFill>
               <a:schemeClr val="accent4"/>
             </a:solidFill>
-            <a:prstDash val="dash"/>
+            <a:prstDash val="solid"/>
             <a:round/>
             <a:headEnd type="none" w="med" len="med"/>
             <a:tailEnd type="none" w="med" len="med"/>
@@ -5803,6 +5911,126 @@
               </a:rPr>
               <a:t>Run the program</a:t>
             </a:r>
+          </a:p>
+        </p:txBody>
+      </p:sp>
+      <p:sp>
+        <p:nvSpPr>
+          <p:cNvPr id="15" name="Rectangle: Rounded Corners 14">
+            <a:extLst>
+              <a:ext uri="{FF2B5EF4-FFF2-40B4-BE49-F238E27FC236}">
+                <a16:creationId xmlns:a16="http://schemas.microsoft.com/office/drawing/2014/main" id="{0E2A0AA5-370C-2CDC-291C-5366C6D573A4}"/>
+              </a:ext>
+            </a:extLst>
+          </p:cNvPr>
+          <p:cNvSpPr/>
+          <p:nvPr/>
+        </p:nvSpPr>
+        <p:spPr>
+          <a:xfrm>
+            <a:off x="2048078" y="4656028"/>
+            <a:ext cx="1039896" cy="192878"/>
+          </a:xfrm>
+          <a:prstGeom prst="roundRect">
+            <a:avLst/>
+          </a:prstGeom>
+          <a:solidFill>
+            <a:srgbClr val="FFFFCC"/>
+          </a:solidFill>
+          <a:effectLst>
+            <a:outerShdw blurRad="50800" dist="38100" dir="18900000" algn="bl" rotWithShape="0">
+              <a:prstClr val="black">
+                <a:alpha val="40000"/>
+              </a:prstClr>
+            </a:outerShdw>
+          </a:effectLst>
+          <a:scene3d>
+            <a:camera prst="obliqueTopRight"/>
+            <a:lightRig rig="threePt" dir="t"/>
+          </a:scene3d>
+        </p:spPr>
+        <p:style>
+          <a:lnRef idx="2">
+            <a:schemeClr val="accent1">
+              <a:shade val="15000"/>
+            </a:schemeClr>
+          </a:lnRef>
+          <a:fillRef idx="1">
+            <a:schemeClr val="accent1"/>
+          </a:fillRef>
+          <a:effectRef idx="0">
+            <a:schemeClr val="accent1"/>
+          </a:effectRef>
+          <a:fontRef idx="minor">
+            <a:schemeClr val="lt1"/>
+          </a:fontRef>
+        </p:style>
+        <p:txBody>
+          <a:bodyPr rtlCol="0" anchor="ctr"/>
+          <a:lstStyle/>
+          <a:p>
+            <a:pPr algn="ctr"/>
+            <a:endParaRPr lang="en-US" baseline="-25000"/>
+          </a:p>
+        </p:txBody>
+      </p:sp>
+      <p:sp>
+        <p:nvSpPr>
+          <p:cNvPr id="20" name="Rectangle: Rounded Corners 19">
+            <a:extLst>
+              <a:ext uri="{FF2B5EF4-FFF2-40B4-BE49-F238E27FC236}">
+                <a16:creationId xmlns:a16="http://schemas.microsoft.com/office/drawing/2014/main" id="{92B1250C-8D0C-4287-C234-67F24BFA68DE}"/>
+              </a:ext>
+            </a:extLst>
+          </p:cNvPr>
+          <p:cNvSpPr/>
+          <p:nvPr/>
+        </p:nvSpPr>
+        <p:spPr>
+          <a:xfrm>
+            <a:off x="2048078" y="4271353"/>
+            <a:ext cx="1039896" cy="192878"/>
+          </a:xfrm>
+          <a:prstGeom prst="roundRect">
+            <a:avLst/>
+          </a:prstGeom>
+          <a:solidFill>
+            <a:srgbClr val="FFFFCC"/>
+          </a:solidFill>
+          <a:effectLst>
+            <a:outerShdw blurRad="50800" dist="38100" dir="18900000" algn="bl" rotWithShape="0">
+              <a:prstClr val="black">
+                <a:alpha val="40000"/>
+              </a:prstClr>
+            </a:outerShdw>
+          </a:effectLst>
+          <a:scene3d>
+            <a:camera prst="obliqueTopRight"/>
+            <a:lightRig rig="threePt" dir="t"/>
+          </a:scene3d>
+        </p:spPr>
+        <p:style>
+          <a:lnRef idx="2">
+            <a:schemeClr val="accent1">
+              <a:shade val="15000"/>
+            </a:schemeClr>
+          </a:lnRef>
+          <a:fillRef idx="1">
+            <a:schemeClr val="accent1"/>
+          </a:fillRef>
+          <a:effectRef idx="0">
+            <a:schemeClr val="accent1"/>
+          </a:effectRef>
+          <a:fontRef idx="minor">
+            <a:schemeClr val="lt1"/>
+          </a:fontRef>
+        </p:style>
+        <p:txBody>
+          <a:bodyPr rtlCol="0" anchor="ctr"/>
+          <a:lstStyle/>
+          <a:p>
+            <a:pPr algn="ctr"/>
+            <a:endParaRPr lang="en-US" baseline="-25000"/>
           </a:p>
         </p:txBody>
       </p:sp>
@@ -7101,15 +7329,27 @@
           <a:p>
             <a:r>
               <a:rPr lang="en-US" dirty="0"/>
-              <a:t>If you are not, then please spend some time on that using the additional slide set, which shows you how to do that with a visual </a:t>
-            </a:r>
-            <a:r>
-              <a:rPr lang="en-US"/>
-              <a:t>method called </a:t>
-            </a:r>
-            <a:r>
-              <a:rPr lang="en-US" dirty="0"/>
-              <a:t>flowcharts.</a:t>
+              <a:t>If you are not, then please spend some time on that using the additional slide set which shows you how to do that with a visual method called flowcharts.</a:t>
+            </a:r>
+          </a:p>
+          <a:p>
+            <a:pPr lvl="1"/>
+            <a:r>
+              <a:rPr lang="en-US" dirty="0"/>
+              <a:t>See 00-x-Flowcharts-to-code</a:t>
+            </a:r>
+          </a:p>
+          <a:p>
+            <a:r>
+              <a:rPr lang="en-US" dirty="0"/>
+              <a:t>It is also useful to have some concept of CPU and memory before proceeding further</a:t>
+            </a:r>
+          </a:p>
+          <a:p>
+            <a:pPr lvl="1"/>
+            <a:r>
+              <a:rPr lang="en-US" dirty="0"/>
+              <a:t>See 00-x-Model-of-Programming</a:t>
             </a:r>
           </a:p>
         </p:txBody>
@@ -10679,8 +10919,19 @@
           <a:p>
             <a:r>
               <a:rPr lang="en-US" dirty="0"/>
-              <a:t>Some things to notice about C</a:t>
-            </a:r>
+              <a:t>Some things to notice about C – </a:t>
+            </a:r>
+            <a:r>
+              <a:rPr lang="en-US" sz="3200" b="1" dirty="0" err="1">
+                <a:latin typeface="Courier New" panose="02070309020205020404" pitchFamily="49" charset="0"/>
+                <a:cs typeface="Courier New" panose="02070309020205020404" pitchFamily="49" charset="0"/>
+              </a:rPr>
+              <a:t>very_first.c</a:t>
+            </a:r>
+            <a:endParaRPr lang="en-US" b="1" dirty="0">
+              <a:latin typeface="Courier New" panose="02070309020205020404" pitchFamily="49" charset="0"/>
+              <a:cs typeface="Courier New" panose="02070309020205020404" pitchFamily="49" charset="0"/>
+            </a:endParaRPr>
           </a:p>
         </p:txBody>
       </p:sp>
@@ -10697,7 +10948,7 @@
         <p:spPr/>
         <p:txBody>
           <a:bodyPr>
-            <a:normAutofit fontScale="92500" lnSpcReduction="10000"/>
+            <a:normAutofit fontScale="92500" lnSpcReduction="20000"/>
           </a:bodyPr>
           <a:lstStyle/>
           <a:p>
@@ -10743,11 +10994,21 @@
               <a:rPr lang="en-US" dirty="0">
                 <a:cs typeface="Courier New" panose="02070309020205020404" pitchFamily="49" charset="0"/>
               </a:rPr>
-              <a:t> function </a:t>
-            </a:r>
-            <a:r>
-              <a:rPr lang="en-US" dirty="0"/>
-              <a:t>call helps us print out something</a:t>
+              <a:t> </a:t>
+            </a:r>
+            <a:r>
+              <a:rPr lang="en-US" i="1" u="sng" dirty="0">
+                <a:cs typeface="Courier New" panose="02070309020205020404" pitchFamily="49" charset="0"/>
+              </a:rPr>
+              <a:t>function </a:t>
+            </a:r>
+            <a:r>
+              <a:rPr lang="en-US" i="1" u="sng" dirty="0"/>
+              <a:t>call </a:t>
+            </a:r>
+            <a:r>
+              <a:rPr lang="en-US" dirty="0"/>
+              <a:t>helps us print out something</a:t>
             </a:r>
             <a:r>
               <a:rPr lang="en-US" i="1" dirty="0"/>
@@ -11814,7 +12075,7 @@
 </file>
 
 <file path=ppt/slides/slide21.xml><?xml version="1.0" encoding="utf-8"?>
-<p:sld xmlns:a="http://schemas.openxmlformats.org/drawingml/2006/main" xmlns:r="http://schemas.openxmlformats.org/officeDocument/2006/relationships" xmlns:p="http://schemas.openxmlformats.org/presentationml/2006/main">
+<p:sld xmlns:a="http://schemas.openxmlformats.org/drawingml/2006/main" xmlns:r="http://schemas.openxmlformats.org/officeDocument/2006/relationships" xmlns:p="http://schemas.openxmlformats.org/presentationml/2006/main" show="0">
   <p:cSld>
     <p:spTree>
       <p:nvGrpSpPr>

</xml_diff>